<commit_message>
added entry point example.
</commit_message>
<xml_diff>
--- a/boost_bug/msm/multi_from.pptx
+++ b/boost_bug/msm/multi_from.pptx
@@ -10,7 +10,7 @@
   <p:sldIdLst>
     <p:sldId id="281" r:id="rId2"/>
   </p:sldIdLst>
-  <p:sldSz cx="4321175" cy="3600450"/>
+  <p:sldSz cx="4321175" cy="4321175"/>
   <p:notesSz cx="6858000" cy="9144000"/>
   <p:defaultTextStyle>
     <a:defPPr>
@@ -192,7 +192,7 @@
           <a:p>
             <a:fld id="{33E477F9-361B-4780-B227-665A41208240}" type="datetimeFigureOut">
               <a:rPr kumimoji="1" lang="ja-JP" altLang="en-US" smtClean="0"/>
-              <a:t>2012/5/29</a:t>
+              <a:t>2012/5/30</a:t>
             </a:fld>
             <a:endParaRPr kumimoji="1" lang="ja-JP" altLang="en-US"/>
           </a:p>
@@ -210,8 +210,8 @@
         </p:nvSpPr>
         <p:spPr>
           <a:xfrm>
-            <a:off x="1371600" y="685800"/>
-            <a:ext cx="4114800" cy="3429000"/>
+            <a:off x="1714500" y="685800"/>
+            <a:ext cx="3429000" cy="3429000"/>
           </a:xfrm>
           <a:prstGeom prst="rect">
             <a:avLst/>
@@ -521,8 +521,8 @@
         </p:nvSpPr>
         <p:spPr>
           <a:xfrm>
-            <a:off x="1371600" y="685800"/>
-            <a:ext cx="4114800" cy="3429000"/>
+            <a:off x="1714500" y="685800"/>
+            <a:ext cx="3429000" cy="3429000"/>
           </a:xfrm>
         </p:spPr>
       </p:sp>
@@ -610,8 +610,8 @@
         </p:nvSpPr>
         <p:spPr>
           <a:xfrm>
-            <a:off x="324089" y="1118474"/>
-            <a:ext cx="3672999" cy="771763"/>
+            <a:off x="324090" y="1342367"/>
+            <a:ext cx="3672999" cy="926252"/>
           </a:xfrm>
         </p:spPr>
         <p:txBody>
@@ -638,8 +638,8 @@
         </p:nvSpPr>
         <p:spPr>
           <a:xfrm>
-            <a:off x="648177" y="2040256"/>
-            <a:ext cx="3024823" cy="920115"/>
+            <a:off x="648178" y="2448668"/>
+            <a:ext cx="3024823" cy="1104300"/>
           </a:xfrm>
         </p:spPr>
         <p:txBody>
@@ -762,7 +762,7 @@
           <a:p>
             <a:fld id="{E90ED720-0104-4369-84BC-D37694168613}" type="datetimeFigureOut">
               <a:rPr kumimoji="1" lang="ja-JP" altLang="en-US" smtClean="0"/>
-              <a:t>2012/5/29</a:t>
+              <a:t>2012/5/30</a:t>
             </a:fld>
             <a:endParaRPr kumimoji="1" lang="ja-JP" altLang="en-US"/>
           </a:p>
@@ -959,7 +959,7 @@
           <a:p>
             <a:fld id="{E90ED720-0104-4369-84BC-D37694168613}" type="datetimeFigureOut">
               <a:rPr kumimoji="1" lang="ja-JP" altLang="en-US" smtClean="0"/>
-              <a:t>2012/5/29</a:t>
+              <a:t>2012/5/30</a:t>
             </a:fld>
             <a:endParaRPr kumimoji="1" lang="ja-JP" altLang="en-US"/>
           </a:p>
@@ -1044,8 +1044,8 @@
         </p:nvSpPr>
         <p:spPr>
           <a:xfrm>
-            <a:off x="3132853" y="144186"/>
-            <a:ext cx="972264" cy="3072051"/>
+            <a:off x="3132853" y="173049"/>
+            <a:ext cx="972264" cy="3687003"/>
           </a:xfrm>
         </p:spPr>
         <p:txBody>
@@ -1072,8 +1072,8 @@
         </p:nvSpPr>
         <p:spPr>
           <a:xfrm>
-            <a:off x="216059" y="144186"/>
-            <a:ext cx="2844773" cy="3072051"/>
+            <a:off x="216060" y="173049"/>
+            <a:ext cx="2844773" cy="3687003"/>
           </a:xfrm>
         </p:spPr>
         <p:txBody>
@@ -1166,7 +1166,7 @@
           <a:p>
             <a:fld id="{E90ED720-0104-4369-84BC-D37694168613}" type="datetimeFigureOut">
               <a:rPr kumimoji="1" lang="ja-JP" altLang="en-US" smtClean="0"/>
-              <a:t>2012/5/29</a:t>
+              <a:t>2012/5/30</a:t>
             </a:fld>
             <a:endParaRPr kumimoji="1" lang="ja-JP" altLang="en-US"/>
           </a:p>
@@ -1363,7 +1363,7 @@
           <a:p>
             <a:fld id="{E90ED720-0104-4369-84BC-D37694168613}" type="datetimeFigureOut">
               <a:rPr kumimoji="1" lang="ja-JP" altLang="en-US" smtClean="0"/>
-              <a:t>2012/5/29</a:t>
+              <a:t>2012/5/30</a:t>
             </a:fld>
             <a:endParaRPr kumimoji="1" lang="ja-JP" altLang="en-US"/>
           </a:p>
@@ -1448,8 +1448,8 @@
         </p:nvSpPr>
         <p:spPr>
           <a:xfrm>
-            <a:off x="341343" y="2313623"/>
-            <a:ext cx="3672999" cy="715089"/>
+            <a:off x="341344" y="2776756"/>
+            <a:ext cx="3672999" cy="858233"/>
           </a:xfrm>
         </p:spPr>
         <p:txBody>
@@ -1480,8 +1480,8 @@
         </p:nvSpPr>
         <p:spPr>
           <a:xfrm>
-            <a:off x="341343" y="1526025"/>
-            <a:ext cx="3672999" cy="787598"/>
+            <a:off x="341344" y="1831499"/>
+            <a:ext cx="3672999" cy="945257"/>
           </a:xfrm>
         </p:spPr>
         <p:txBody>
@@ -1604,7 +1604,7 @@
           <a:p>
             <a:fld id="{E90ED720-0104-4369-84BC-D37694168613}" type="datetimeFigureOut">
               <a:rPr kumimoji="1" lang="ja-JP" altLang="en-US" smtClean="0"/>
-              <a:t>2012/5/29</a:t>
+              <a:t>2012/5/30</a:t>
             </a:fld>
             <a:endParaRPr kumimoji="1" lang="ja-JP" altLang="en-US"/>
           </a:p>
@@ -1712,8 +1712,8 @@
         </p:nvSpPr>
         <p:spPr>
           <a:xfrm>
-            <a:off x="216059" y="840106"/>
-            <a:ext cx="1908519" cy="2376131"/>
+            <a:off x="216060" y="1008276"/>
+            <a:ext cx="1908519" cy="2851776"/>
           </a:xfrm>
         </p:spPr>
         <p:txBody>
@@ -1829,8 +1829,8 @@
         </p:nvSpPr>
         <p:spPr>
           <a:xfrm>
-            <a:off x="2196599" y="840106"/>
-            <a:ext cx="1908519" cy="2376131"/>
+            <a:off x="2196600" y="1008276"/>
+            <a:ext cx="1908519" cy="2851776"/>
           </a:xfrm>
         </p:spPr>
         <p:txBody>
@@ -1951,7 +1951,7 @@
           <a:p>
             <a:fld id="{E90ED720-0104-4369-84BC-D37694168613}" type="datetimeFigureOut">
               <a:rPr kumimoji="1" lang="ja-JP" altLang="en-US" smtClean="0"/>
-              <a:t>2012/5/29</a:t>
+              <a:t>2012/5/30</a:t>
             </a:fld>
             <a:endParaRPr kumimoji="1" lang="ja-JP" altLang="en-US"/>
           </a:p>
@@ -2063,8 +2063,8 @@
         </p:nvSpPr>
         <p:spPr>
           <a:xfrm>
-            <a:off x="216059" y="805934"/>
-            <a:ext cx="1909269" cy="335875"/>
+            <a:off x="216060" y="967264"/>
+            <a:ext cx="1909269" cy="403109"/>
           </a:xfrm>
         </p:spPr>
         <p:txBody>
@@ -2128,8 +2128,8 @@
         </p:nvSpPr>
         <p:spPr>
           <a:xfrm>
-            <a:off x="216059" y="1141809"/>
-            <a:ext cx="1909269" cy="2074426"/>
+            <a:off x="216060" y="1370372"/>
+            <a:ext cx="1909269" cy="2489677"/>
           </a:xfrm>
         </p:spPr>
         <p:txBody>
@@ -2245,8 +2245,8 @@
         </p:nvSpPr>
         <p:spPr>
           <a:xfrm>
-            <a:off x="2195098" y="805934"/>
-            <a:ext cx="1910019" cy="335875"/>
+            <a:off x="2195099" y="967264"/>
+            <a:ext cx="1910019" cy="403109"/>
           </a:xfrm>
         </p:spPr>
         <p:txBody>
@@ -2310,8 +2310,8 @@
         </p:nvSpPr>
         <p:spPr>
           <a:xfrm>
-            <a:off x="2195098" y="1141809"/>
-            <a:ext cx="1910019" cy="2074426"/>
+            <a:off x="2195099" y="1370372"/>
+            <a:ext cx="1910019" cy="2489677"/>
           </a:xfrm>
         </p:spPr>
         <p:txBody>
@@ -2432,7 +2432,7 @@
           <a:p>
             <a:fld id="{E90ED720-0104-4369-84BC-D37694168613}" type="datetimeFigureOut">
               <a:rPr kumimoji="1" lang="ja-JP" altLang="en-US" smtClean="0"/>
-              <a:t>2012/5/29</a:t>
+              <a:t>2012/5/30</a:t>
             </a:fld>
             <a:endParaRPr kumimoji="1" lang="ja-JP" altLang="en-US"/>
           </a:p>
@@ -2545,7 +2545,7 @@
           <a:p>
             <a:fld id="{E90ED720-0104-4369-84BC-D37694168613}" type="datetimeFigureOut">
               <a:rPr kumimoji="1" lang="ja-JP" altLang="en-US" smtClean="0"/>
-              <a:t>2012/5/29</a:t>
+              <a:t>2012/5/30</a:t>
             </a:fld>
             <a:endParaRPr kumimoji="1" lang="ja-JP" altLang="en-US"/>
           </a:p>
@@ -2635,7 +2635,7 @@
           <a:p>
             <a:fld id="{E90ED720-0104-4369-84BC-D37694168613}" type="datetimeFigureOut">
               <a:rPr kumimoji="1" lang="ja-JP" altLang="en-US" smtClean="0"/>
-              <a:t>2012/5/29</a:t>
+              <a:t>2012/5/30</a:t>
             </a:fld>
             <a:endParaRPr kumimoji="1" lang="ja-JP" altLang="en-US"/>
           </a:p>
@@ -2720,8 +2720,8 @@
         </p:nvSpPr>
         <p:spPr>
           <a:xfrm>
-            <a:off x="216060" y="143351"/>
-            <a:ext cx="1421636" cy="610076"/>
+            <a:off x="216060" y="172046"/>
+            <a:ext cx="1421636" cy="732199"/>
           </a:xfrm>
         </p:spPr>
         <p:txBody>
@@ -2752,8 +2752,8 @@
         </p:nvSpPr>
         <p:spPr>
           <a:xfrm>
-            <a:off x="1689460" y="143352"/>
-            <a:ext cx="2415657" cy="3072884"/>
+            <a:off x="1689461" y="172048"/>
+            <a:ext cx="2415657" cy="3688003"/>
           </a:xfrm>
         </p:spPr>
         <p:txBody>
@@ -2869,8 +2869,8 @@
         </p:nvSpPr>
         <p:spPr>
           <a:xfrm>
-            <a:off x="216060" y="753428"/>
-            <a:ext cx="1421636" cy="2462808"/>
+            <a:off x="216060" y="904246"/>
+            <a:ext cx="1421636" cy="2955804"/>
           </a:xfrm>
         </p:spPr>
         <p:txBody>
@@ -2939,7 +2939,7 @@
           <a:p>
             <a:fld id="{E90ED720-0104-4369-84BC-D37694168613}" type="datetimeFigureOut">
               <a:rPr kumimoji="1" lang="ja-JP" altLang="en-US" smtClean="0"/>
-              <a:t>2012/5/29</a:t>
+              <a:t>2012/5/30</a:t>
             </a:fld>
             <a:endParaRPr kumimoji="1" lang="ja-JP" altLang="en-US"/>
           </a:p>
@@ -3024,8 +3024,8 @@
         </p:nvSpPr>
         <p:spPr>
           <a:xfrm>
-            <a:off x="846980" y="2520316"/>
-            <a:ext cx="2592705" cy="297537"/>
+            <a:off x="846981" y="3024824"/>
+            <a:ext cx="2592705" cy="357097"/>
           </a:xfrm>
         </p:spPr>
         <p:txBody>
@@ -3056,8 +3056,8 @@
         </p:nvSpPr>
         <p:spPr>
           <a:xfrm>
-            <a:off x="846980" y="321707"/>
-            <a:ext cx="2592705" cy="2160270"/>
+            <a:off x="846981" y="386105"/>
+            <a:ext cx="2592705" cy="2592705"/>
           </a:xfrm>
         </p:spPr>
         <p:txBody>
@@ -3117,8 +3117,8 @@
         </p:nvSpPr>
         <p:spPr>
           <a:xfrm>
-            <a:off x="846980" y="2817853"/>
-            <a:ext cx="2592705" cy="422553"/>
+            <a:off x="846981" y="3381921"/>
+            <a:ext cx="2592705" cy="507138"/>
           </a:xfrm>
         </p:spPr>
         <p:txBody>
@@ -3187,7 +3187,7 @@
           <a:p>
             <a:fld id="{E90ED720-0104-4369-84BC-D37694168613}" type="datetimeFigureOut">
               <a:rPr kumimoji="1" lang="ja-JP" altLang="en-US" smtClean="0"/>
-              <a:t>2012/5/29</a:t>
+              <a:t>2012/5/30</a:t>
             </a:fld>
             <a:endParaRPr kumimoji="1" lang="ja-JP" altLang="en-US"/>
           </a:p>
@@ -3277,8 +3277,8 @@
         </p:nvSpPr>
         <p:spPr>
           <a:xfrm>
-            <a:off x="216060" y="144185"/>
-            <a:ext cx="3889058" cy="600075"/>
+            <a:off x="216060" y="173048"/>
+            <a:ext cx="3889058" cy="720196"/>
           </a:xfrm>
           <a:prstGeom prst="rect">
             <a:avLst/>
@@ -3310,8 +3310,8 @@
         </p:nvSpPr>
         <p:spPr>
           <a:xfrm>
-            <a:off x="216060" y="840106"/>
-            <a:ext cx="3889058" cy="2376131"/>
+            <a:off x="216060" y="1008276"/>
+            <a:ext cx="3889058" cy="2851776"/>
           </a:xfrm>
           <a:prstGeom prst="rect">
             <a:avLst/>
@@ -3404,8 +3404,8 @@
         </p:nvSpPr>
         <p:spPr>
           <a:xfrm>
-            <a:off x="216060" y="3337084"/>
-            <a:ext cx="1008274" cy="191691"/>
+            <a:off x="216060" y="4005090"/>
+            <a:ext cx="1008274" cy="230063"/>
           </a:xfrm>
           <a:prstGeom prst="rect">
             <a:avLst/>
@@ -3427,7 +3427,7 @@
           <a:p>
             <a:fld id="{E90ED720-0104-4369-84BC-D37694168613}" type="datetimeFigureOut">
               <a:rPr kumimoji="1" lang="ja-JP" altLang="en-US" smtClean="0"/>
-              <a:t>2012/5/29</a:t>
+              <a:t>2012/5/30</a:t>
             </a:fld>
             <a:endParaRPr kumimoji="1" lang="ja-JP" altLang="en-US"/>
           </a:p>
@@ -3445,8 +3445,8 @@
         </p:nvSpPr>
         <p:spPr>
           <a:xfrm>
-            <a:off x="1476402" y="3337084"/>
-            <a:ext cx="1368373" cy="191691"/>
+            <a:off x="1476403" y="4005090"/>
+            <a:ext cx="1368373" cy="230063"/>
           </a:xfrm>
           <a:prstGeom prst="rect">
             <a:avLst/>
@@ -3482,8 +3482,8 @@
         </p:nvSpPr>
         <p:spPr>
           <a:xfrm>
-            <a:off x="3096844" y="3337084"/>
-            <a:ext cx="1008274" cy="191691"/>
+            <a:off x="3096844" y="4005090"/>
+            <a:ext cx="1008274" cy="230063"/>
           </a:xfrm>
           <a:prstGeom prst="rect">
             <a:avLst/>
@@ -3797,18 +3797,94 @@
           <a:chExt cx="0" cy="0"/>
         </a:xfrm>
       </p:grpSpPr>
+      <p:sp>
+        <p:nvSpPr>
+          <p:cNvPr id="65" name="円/楕円 64"/>
+          <p:cNvSpPr/>
+          <p:nvPr/>
+        </p:nvSpPr>
+        <p:spPr>
+          <a:xfrm>
+            <a:off x="1851677" y="2305069"/>
+            <a:ext cx="1430755" cy="162824"/>
+          </a:xfrm>
+          <a:prstGeom prst="ellipse">
+            <a:avLst/>
+          </a:prstGeom>
+        </p:spPr>
+        <p:style>
+          <a:lnRef idx="1">
+            <a:schemeClr val="accent6"/>
+          </a:lnRef>
+          <a:fillRef idx="2">
+            <a:schemeClr val="accent6"/>
+          </a:fillRef>
+          <a:effectRef idx="1">
+            <a:schemeClr val="accent6"/>
+          </a:effectRef>
+          <a:fontRef idx="minor">
+            <a:schemeClr val="dk1"/>
+          </a:fontRef>
+        </p:style>
+        <p:txBody>
+          <a:bodyPr rtlCol="0" anchor="ctr"/>
+          <a:lstStyle/>
+          <a:p>
+            <a:pPr algn="ctr"/>
+            <a:endParaRPr kumimoji="1" lang="ja-JP" altLang="en-US"/>
+          </a:p>
+        </p:txBody>
+      </p:sp>
+      <p:sp>
+        <p:nvSpPr>
+          <p:cNvPr id="66" name="円/楕円 65"/>
+          <p:cNvSpPr/>
+          <p:nvPr/>
+        </p:nvSpPr>
+        <p:spPr>
+          <a:xfrm>
+            <a:off x="1207686" y="1981891"/>
+            <a:ext cx="304829" cy="1402832"/>
+          </a:xfrm>
+          <a:prstGeom prst="ellipse">
+            <a:avLst/>
+          </a:prstGeom>
+        </p:spPr>
+        <p:style>
+          <a:lnRef idx="1">
+            <a:schemeClr val="accent6"/>
+          </a:lnRef>
+          <a:fillRef idx="2">
+            <a:schemeClr val="accent6"/>
+          </a:fillRef>
+          <a:effectRef idx="1">
+            <a:schemeClr val="accent6"/>
+          </a:effectRef>
+          <a:fontRef idx="minor">
+            <a:schemeClr val="dk1"/>
+          </a:fontRef>
+        </p:style>
+        <p:txBody>
+          <a:bodyPr rtlCol="0" anchor="ctr"/>
+          <a:lstStyle/>
+          <a:p>
+            <a:pPr algn="ctr"/>
+            <a:endParaRPr kumimoji="1" lang="ja-JP" altLang="en-US"/>
+          </a:p>
+        </p:txBody>
+      </p:sp>
       <p:cxnSp>
         <p:nvCxnSpPr>
-          <p:cNvPr id="142" name="直線矢印コネクタ 28"/>
+          <p:cNvPr id="67" name="直線矢印コネクタ 28"/>
           <p:cNvCxnSpPr>
-            <a:stCxn id="163" idx="4"/>
-            <a:endCxn id="153" idx="0"/>
+            <a:stCxn id="73" idx="4"/>
+            <a:endCxn id="71" idx="0"/>
           </p:cNvCxnSpPr>
           <p:nvPr/>
         </p:nvCxnSpPr>
         <p:spPr>
           <a:xfrm>
-            <a:off x="678103" y="1154233"/>
+            <a:off x="678103" y="1802627"/>
             <a:ext cx="1" cy="179264"/>
           </a:xfrm>
           <a:prstGeom prst="straightConnector1">
@@ -3838,13 +3914,13 @@
       </p:cxnSp>
       <p:sp>
         <p:nvSpPr>
-          <p:cNvPr id="150" name="正方形/長方形 149"/>
+          <p:cNvPr id="68" name="正方形/長方形 67"/>
           <p:cNvSpPr/>
           <p:nvPr/>
         </p:nvSpPr>
         <p:spPr>
           <a:xfrm>
-            <a:off x="72356" y="237142"/>
+            <a:off x="72356" y="885536"/>
             <a:ext cx="4176464" cy="3147259"/>
           </a:xfrm>
           <a:prstGeom prst="rect">
@@ -3884,13 +3960,13 @@
       </p:sp>
       <p:sp>
         <p:nvSpPr>
-          <p:cNvPr id="151" name="1 つの角を切り取った四角形 150"/>
+          <p:cNvPr id="69" name="1 つの角を切り取った四角形 68"/>
           <p:cNvSpPr/>
           <p:nvPr/>
         </p:nvSpPr>
         <p:spPr>
           <a:xfrm flipV="1">
-            <a:off x="72356" y="245134"/>
+            <a:off x="72356" y="893528"/>
             <a:ext cx="866782" cy="305136"/>
           </a:xfrm>
           <a:prstGeom prst="snip1Rect">
@@ -3932,13 +4008,13 @@
       </p:sp>
       <p:sp>
         <p:nvSpPr>
-          <p:cNvPr id="152" name="正方形/長方形 151"/>
+          <p:cNvPr id="70" name="正方形/長方形 69"/>
           <p:cNvSpPr/>
           <p:nvPr/>
         </p:nvSpPr>
         <p:spPr>
           <a:xfrm>
-            <a:off x="72357" y="225714"/>
+            <a:off x="72357" y="874108"/>
             <a:ext cx="1034051" cy="246221"/>
           </a:xfrm>
           <a:prstGeom prst="rect">
@@ -3961,13 +4037,13 @@
       </p:sp>
       <p:sp>
         <p:nvSpPr>
-          <p:cNvPr id="153" name="角丸四角形 152"/>
+          <p:cNvPr id="71" name="角丸四角形 70"/>
           <p:cNvSpPr/>
           <p:nvPr/>
         </p:nvSpPr>
         <p:spPr>
           <a:xfrm>
-            <a:off x="144363" y="1333497"/>
+            <a:off x="144363" y="1981891"/>
             <a:ext cx="1067481" cy="538736"/>
           </a:xfrm>
           <a:prstGeom prst="roundRect">
@@ -4019,13 +4095,13 @@
       </p:sp>
       <p:cxnSp>
         <p:nvCxnSpPr>
-          <p:cNvPr id="154" name="直線コネクタ 153"/>
+          <p:cNvPr id="72" name="直線コネクタ 71"/>
           <p:cNvCxnSpPr/>
           <p:nvPr/>
         </p:nvCxnSpPr>
         <p:spPr>
           <a:xfrm>
-            <a:off x="149124" y="1587550"/>
+            <a:off x="149124" y="2235944"/>
             <a:ext cx="1058562" cy="0"/>
           </a:xfrm>
           <a:prstGeom prst="line">
@@ -4054,13 +4130,13 @@
       </p:cxnSp>
       <p:sp>
         <p:nvSpPr>
-          <p:cNvPr id="163" name="フローチャート : 結合子 162"/>
+          <p:cNvPr id="73" name="フローチャート : 結合子 72"/>
           <p:cNvSpPr/>
           <p:nvPr/>
         </p:nvSpPr>
         <p:spPr>
           <a:xfrm>
-            <a:off x="606092" y="1010213"/>
+            <a:off x="606092" y="1658607"/>
             <a:ext cx="144021" cy="144020"/>
           </a:xfrm>
           <a:prstGeom prst="flowChartConnector">
@@ -4102,14 +4178,14 @@
       </p:sp>
       <p:sp>
         <p:nvSpPr>
-          <p:cNvPr id="44" name="角丸四角形 43"/>
+          <p:cNvPr id="74" name="角丸四角形 73"/>
           <p:cNvSpPr/>
           <p:nvPr/>
         </p:nvSpPr>
         <p:spPr>
           <a:xfrm>
-            <a:off x="1721829" y="1512193"/>
-            <a:ext cx="2382974" cy="1512168"/>
+            <a:off x="1721829" y="1046096"/>
+            <a:ext cx="2382974" cy="2842683"/>
           </a:xfrm>
           <a:prstGeom prst="roundRect">
             <a:avLst/>
@@ -4160,17 +4236,17 @@
       </p:sp>
       <p:cxnSp>
         <p:nvCxnSpPr>
-          <p:cNvPr id="23" name="直線矢印コネクタ 28"/>
+          <p:cNvPr id="75" name="直線矢印コネクタ 28"/>
           <p:cNvCxnSpPr>
-            <a:stCxn id="153" idx="3"/>
-            <a:endCxn id="13" idx="2"/>
+            <a:stCxn id="71" idx="3"/>
+            <a:endCxn id="77" idx="2"/>
           </p:cNvCxnSpPr>
           <p:nvPr/>
         </p:nvCxnSpPr>
         <p:spPr>
           <a:xfrm>
-            <a:off x="1211844" y="1602865"/>
-            <a:ext cx="437974" cy="1008112"/>
+            <a:off x="1211844" y="2251259"/>
+            <a:ext cx="437974" cy="372788"/>
           </a:xfrm>
           <a:prstGeom prst="straightConnector1">
             <a:avLst/>
@@ -4199,13 +4275,13 @@
       </p:cxnSp>
       <p:sp>
         <p:nvSpPr>
-          <p:cNvPr id="18" name="正方形/長方形 17"/>
+          <p:cNvPr id="76" name="正方形/長方形 75"/>
           <p:cNvSpPr/>
           <p:nvPr/>
         </p:nvSpPr>
         <p:spPr>
           <a:xfrm>
-            <a:off x="1152475" y="1337980"/>
+            <a:off x="1152475" y="1986374"/>
             <a:ext cx="866781" cy="246221"/>
           </a:xfrm>
           <a:prstGeom prst="rect">
@@ -4242,13 +4318,13 @@
       </p:sp>
       <p:sp>
         <p:nvSpPr>
-          <p:cNvPr id="13" name="フローチャート : 結合子 12"/>
+          <p:cNvPr id="77" name="フローチャート : 結合子 76"/>
           <p:cNvSpPr/>
           <p:nvPr/>
         </p:nvSpPr>
         <p:spPr>
           <a:xfrm>
-            <a:off x="1649818" y="2538967"/>
+            <a:off x="1649818" y="2552037"/>
             <a:ext cx="144021" cy="144020"/>
           </a:xfrm>
           <a:prstGeom prst="flowChartConnector">
@@ -4290,13 +4366,13 @@
       </p:sp>
       <p:sp>
         <p:nvSpPr>
-          <p:cNvPr id="21" name="正方形/長方形 20"/>
+          <p:cNvPr id="78" name="正方形/長方形 77"/>
           <p:cNvSpPr/>
           <p:nvPr/>
         </p:nvSpPr>
         <p:spPr>
           <a:xfrm>
-            <a:off x="1714203" y="2637557"/>
+            <a:off x="1512515" y="2664643"/>
             <a:ext cx="625094" cy="246221"/>
           </a:xfrm>
           <a:prstGeom prst="rect">
@@ -4319,13 +4395,13 @@
       </p:sp>
       <p:sp>
         <p:nvSpPr>
-          <p:cNvPr id="26" name="フローチャート : 結合子 25"/>
+          <p:cNvPr id="79" name="フローチャート : 結合子 78"/>
           <p:cNvSpPr/>
           <p:nvPr/>
         </p:nvSpPr>
         <p:spPr>
           <a:xfrm>
-            <a:off x="3282432" y="1926899"/>
+            <a:off x="3282432" y="3024679"/>
             <a:ext cx="144021" cy="144020"/>
           </a:xfrm>
           <a:prstGeom prst="flowChartConnector">
@@ -4367,13 +4443,13 @@
       </p:sp>
       <p:sp>
         <p:nvSpPr>
-          <p:cNvPr id="32" name="角丸四角形 31"/>
+          <p:cNvPr id="80" name="角丸四角形 79"/>
           <p:cNvSpPr/>
           <p:nvPr/>
         </p:nvSpPr>
         <p:spPr>
           <a:xfrm>
-            <a:off x="2820401" y="2341609"/>
+            <a:off x="2820401" y="3278035"/>
             <a:ext cx="1067481" cy="538736"/>
           </a:xfrm>
           <a:prstGeom prst="roundRect">
@@ -4413,7 +4489,7 @@
                   <a:schemeClr val="tx1"/>
                 </a:solidFill>
               </a:rPr>
-              <a:t>State3_1</a:t>
+              <a:t>State3_2</a:t>
             </a:r>
             <a:endParaRPr lang="ja-JP" altLang="en-US" sz="1000" dirty="0">
               <a:solidFill>
@@ -4425,13 +4501,13 @@
       </p:sp>
       <p:cxnSp>
         <p:nvCxnSpPr>
-          <p:cNvPr id="33" name="直線コネクタ 32"/>
+          <p:cNvPr id="81" name="直線コネクタ 80"/>
           <p:cNvCxnSpPr/>
           <p:nvPr/>
         </p:nvCxnSpPr>
         <p:spPr>
           <a:xfrm>
-            <a:off x="2825162" y="2595662"/>
+            <a:off x="2825162" y="3532088"/>
             <a:ext cx="1058562" cy="0"/>
           </a:xfrm>
           <a:prstGeom prst="line">
@@ -4460,17 +4536,17 @@
       </p:cxnSp>
       <p:cxnSp>
         <p:nvCxnSpPr>
-          <p:cNvPr id="43" name="直線矢印コネクタ 28"/>
+          <p:cNvPr id="82" name="直線矢印コネクタ 28"/>
           <p:cNvCxnSpPr>
-            <a:stCxn id="26" idx="4"/>
-            <a:endCxn id="32" idx="0"/>
+            <a:stCxn id="79" idx="4"/>
+            <a:endCxn id="80" idx="0"/>
           </p:cNvCxnSpPr>
           <p:nvPr/>
         </p:nvCxnSpPr>
         <p:spPr>
           <a:xfrm flipH="1">
-            <a:off x="3354142" y="2070919"/>
-            <a:ext cx="301" cy="270690"/>
+            <a:off x="3354142" y="3168699"/>
+            <a:ext cx="301" cy="109336"/>
           </a:xfrm>
           <a:prstGeom prst="straightConnector1">
             <a:avLst/>
@@ -4499,17 +4575,17 @@
       </p:cxnSp>
       <p:cxnSp>
         <p:nvCxnSpPr>
-          <p:cNvPr id="47" name="直線矢印コネクタ 28"/>
+          <p:cNvPr id="83" name="直線矢印コネクタ 28"/>
           <p:cNvCxnSpPr>
-            <a:stCxn id="13" idx="6"/>
-            <a:endCxn id="32" idx="1"/>
+            <a:stCxn id="77" idx="5"/>
+            <a:endCxn id="80" idx="1"/>
           </p:cNvCxnSpPr>
           <p:nvPr/>
         </p:nvCxnSpPr>
         <p:spPr>
           <a:xfrm>
-            <a:off x="1793839" y="2610977"/>
-            <a:ext cx="1026562" cy="0"/>
+            <a:off x="1772748" y="2674966"/>
+            <a:ext cx="1047653" cy="872437"/>
           </a:xfrm>
           <a:prstGeom prst="straightConnector1">
             <a:avLst/>
@@ -4538,13 +4614,13 @@
       </p:cxnSp>
       <p:cxnSp>
         <p:nvCxnSpPr>
-          <p:cNvPr id="29" name="直線コネクタ 28"/>
+          <p:cNvPr id="84" name="直線コネクタ 83"/>
           <p:cNvCxnSpPr/>
           <p:nvPr/>
         </p:nvCxnSpPr>
         <p:spPr>
           <a:xfrm>
-            <a:off x="1721828" y="1899295"/>
+            <a:off x="1721828" y="1368499"/>
             <a:ext cx="2382975" cy="0"/>
           </a:xfrm>
           <a:prstGeom prst="line">
@@ -4573,119 +4649,13 @@
       </p:cxnSp>
       <p:sp>
         <p:nvSpPr>
-          <p:cNvPr id="35" name="正方形/長方形 34"/>
+          <p:cNvPr id="85" name="角丸四角形 84"/>
           <p:cNvSpPr/>
           <p:nvPr/>
         </p:nvSpPr>
         <p:spPr>
           <a:xfrm>
-            <a:off x="2825162" y="2598189"/>
-            <a:ext cx="1058562" cy="246221"/>
-          </a:xfrm>
-          <a:prstGeom prst="rect">
-            <a:avLst/>
-          </a:prstGeom>
-        </p:spPr>
-        <p:txBody>
-          <a:bodyPr wrap="square" lIns="91439" tIns="45720" rIns="91439" bIns="45720">
-            <a:spAutoFit/>
-          </a:bodyPr>
-          <a:lstStyle/>
-          <a:p>
-            <a:r>
-              <a:rPr lang="en-US" altLang="ja-JP" sz="1000" dirty="0" smtClean="0">
-                <a:solidFill>
-                  <a:schemeClr val="tx2">
-                    <a:lumMod val="60000"/>
-                    <a:lumOff val="40000"/>
-                  </a:schemeClr>
-                </a:solidFill>
-              </a:rPr>
-              <a:t>Event1</a:t>
-            </a:r>
-            <a:r>
-              <a:rPr lang="en-US" altLang="ja-JP" sz="1000" dirty="0" smtClean="0"/>
-              <a:t>/</a:t>
-            </a:r>
-            <a:r>
-              <a:rPr lang="en-US" altLang="ja-JP" sz="1000" dirty="0" smtClean="0">
-                <a:solidFill>
-                  <a:srgbClr val="FF0000"/>
-                </a:solidFill>
-              </a:rPr>
-              <a:t>Action1</a:t>
-            </a:r>
-            <a:endParaRPr lang="ja-JP" altLang="en-US" sz="1000" dirty="0">
-              <a:solidFill>
-                <a:srgbClr val="FF0000"/>
-              </a:solidFill>
-            </a:endParaRPr>
-          </a:p>
-        </p:txBody>
-      </p:sp>
-      <p:sp>
-        <p:nvSpPr>
-          <p:cNvPr id="24" name="正方形/長方形 23"/>
-          <p:cNvSpPr/>
-          <p:nvPr/>
-        </p:nvSpPr>
-        <p:spPr>
-          <a:xfrm>
-            <a:off x="1728538" y="2364756"/>
-            <a:ext cx="1408703" cy="246221"/>
-          </a:xfrm>
-          <a:prstGeom prst="rect">
-            <a:avLst/>
-          </a:prstGeom>
-        </p:spPr>
-        <p:txBody>
-          <a:bodyPr wrap="square" lIns="91439" tIns="45720" rIns="91439" bIns="45720">
-            <a:spAutoFit/>
-          </a:bodyPr>
-          <a:lstStyle/>
-          <a:p>
-            <a:r>
-              <a:rPr lang="en-US" altLang="ja-JP" sz="1000" dirty="0" smtClean="0">
-                <a:solidFill>
-                  <a:schemeClr val="tx2">
-                    <a:lumMod val="60000"/>
-                    <a:lumOff val="40000"/>
-                  </a:schemeClr>
-                </a:solidFill>
-              </a:rPr>
-              <a:t>Event1 </a:t>
-            </a:r>
-            <a:r>
-              <a:rPr lang="en-US" altLang="ja-JP" sz="1000" dirty="0" smtClean="0">
-                <a:solidFill>
-                  <a:schemeClr val="tx2">
-                    <a:lumMod val="60000"/>
-                    <a:lumOff val="40000"/>
-                  </a:schemeClr>
-                </a:solidFill>
-              </a:rPr>
-              <a:t>, Event2 ??</a:t>
-            </a:r>
-            <a:endParaRPr lang="ja-JP" altLang="en-US" sz="1000" dirty="0">
-              <a:solidFill>
-                <a:schemeClr val="tx2">
-                  <a:lumMod val="60000"/>
-                  <a:lumOff val="40000"/>
-                </a:schemeClr>
-              </a:solidFill>
-            </a:endParaRPr>
-          </a:p>
-        </p:txBody>
-      </p:sp>
-      <p:sp>
-        <p:nvSpPr>
-          <p:cNvPr id="27" name="角丸四角形 26"/>
-          <p:cNvSpPr/>
-          <p:nvPr/>
-        </p:nvSpPr>
-        <p:spPr>
-          <a:xfrm>
-            <a:off x="144363" y="2622660"/>
+            <a:off x="144363" y="3271054"/>
             <a:ext cx="1067481" cy="538736"/>
           </a:xfrm>
           <a:prstGeom prst="roundRect">
@@ -4737,13 +4707,13 @@
       </p:sp>
       <p:cxnSp>
         <p:nvCxnSpPr>
-          <p:cNvPr id="28" name="直線コネクタ 27"/>
+          <p:cNvPr id="86" name="直線コネクタ 85"/>
           <p:cNvCxnSpPr/>
           <p:nvPr/>
         </p:nvCxnSpPr>
         <p:spPr>
           <a:xfrm>
-            <a:off x="149124" y="2876713"/>
+            <a:off x="149124" y="3525107"/>
             <a:ext cx="1058562" cy="0"/>
           </a:xfrm>
           <a:prstGeom prst="line">
@@ -4772,17 +4742,17 @@
       </p:cxnSp>
       <p:cxnSp>
         <p:nvCxnSpPr>
-          <p:cNvPr id="30" name="直線矢印コネクタ 28"/>
+          <p:cNvPr id="87" name="直線矢印コネクタ 28"/>
           <p:cNvCxnSpPr>
-            <a:stCxn id="27" idx="3"/>
-            <a:endCxn id="13" idx="2"/>
+            <a:stCxn id="85" idx="3"/>
+            <a:endCxn id="77" idx="2"/>
           </p:cNvCxnSpPr>
           <p:nvPr/>
         </p:nvCxnSpPr>
         <p:spPr>
           <a:xfrm flipV="1">
-            <a:off x="1211844" y="2610977"/>
-            <a:ext cx="437974" cy="281051"/>
+            <a:off x="1211844" y="2624047"/>
+            <a:ext cx="437974" cy="916375"/>
           </a:xfrm>
           <a:prstGeom prst="straightConnector1">
             <a:avLst/>
@@ -4811,13 +4781,13 @@
       </p:cxnSp>
       <p:sp>
         <p:nvSpPr>
-          <p:cNvPr id="34" name="正方形/長方形 33"/>
+          <p:cNvPr id="88" name="正方形/長方形 87"/>
           <p:cNvSpPr/>
           <p:nvPr/>
         </p:nvSpPr>
         <p:spPr>
           <a:xfrm>
-            <a:off x="1152475" y="2844410"/>
+            <a:off x="1152475" y="3492804"/>
             <a:ext cx="866781" cy="246221"/>
           </a:xfrm>
           <a:prstGeom prst="rect">
@@ -4854,16 +4824,16 @@
       </p:sp>
       <p:cxnSp>
         <p:nvCxnSpPr>
-          <p:cNvPr id="37" name="直線矢印コネクタ 28"/>
+          <p:cNvPr id="89" name="直線矢印コネクタ 28"/>
           <p:cNvCxnSpPr>
-            <a:stCxn id="153" idx="2"/>
-            <a:endCxn id="27" idx="0"/>
+            <a:stCxn id="71" idx="2"/>
+            <a:endCxn id="85" idx="0"/>
           </p:cNvCxnSpPr>
           <p:nvPr/>
         </p:nvCxnSpPr>
         <p:spPr>
           <a:xfrm>
-            <a:off x="678104" y="1872233"/>
+            <a:off x="678104" y="2520627"/>
             <a:ext cx="0" cy="750427"/>
           </a:xfrm>
           <a:prstGeom prst="straightConnector1">
@@ -4893,13 +4863,13 @@
       </p:cxnSp>
       <p:sp>
         <p:nvSpPr>
-          <p:cNvPr id="38" name="正方形/長方形 37"/>
+          <p:cNvPr id="90" name="正方形/長方形 89"/>
           <p:cNvSpPr/>
           <p:nvPr/>
         </p:nvSpPr>
         <p:spPr>
           <a:xfrm>
-            <a:off x="144363" y="2058060"/>
+            <a:off x="144363" y="2706454"/>
             <a:ext cx="866781" cy="246221"/>
           </a:xfrm>
           <a:prstGeom prst="rect">
@@ -4922,19 +4892,19 @@
       </p:sp>
       <p:sp>
         <p:nvSpPr>
-          <p:cNvPr id="31" name="角丸四角形吹き出し 30"/>
+          <p:cNvPr id="91" name="角丸四角形吹き出し 90"/>
           <p:cNvSpPr/>
           <p:nvPr/>
         </p:nvSpPr>
         <p:spPr>
           <a:xfrm>
-            <a:off x="1936550" y="1998908"/>
-            <a:ext cx="1160141" cy="207355"/>
+            <a:off x="360387" y="1368500"/>
+            <a:ext cx="1245216" cy="340834"/>
           </a:xfrm>
           <a:prstGeom prst="wedgeRoundRectCallout">
             <a:avLst>
-              <a:gd name="adj1" fmla="val -25739"/>
-              <a:gd name="adj2" fmla="val 154249"/>
+              <a:gd name="adj1" fmla="val 29019"/>
+              <a:gd name="adj2" fmla="val 125383"/>
               <a:gd name="adj3" fmla="val 16667"/>
             </a:avLst>
           </a:prstGeom>
@@ -5058,7 +5028,23 @@
                   <a:schemeClr val="tx1"/>
                 </a:solidFill>
               </a:rPr>
-              <a:t>I want to use none.</a:t>
+              <a:t>OK, transition </a:t>
+            </a:r>
+            <a:r>
+              <a:rPr lang="en-US" altLang="ja-JP" b="1" dirty="0" smtClean="0">
+                <a:solidFill>
+                  <a:schemeClr val="tx1"/>
+                </a:solidFill>
+              </a:rPr>
+              <a:t>from</a:t>
+            </a:r>
+            <a:r>
+              <a:rPr lang="en-US" altLang="ja-JP" dirty="0" smtClean="0">
+                <a:solidFill>
+                  <a:schemeClr val="tx1"/>
+                </a:solidFill>
+              </a:rPr>
+              <a:t> is not mentioned</a:t>
             </a:r>
             <a:endParaRPr kumimoji="1" lang="ja-JP" altLang="en-US" dirty="0">
               <a:solidFill>
@@ -5068,6 +5054,1033 @@
           </a:p>
         </p:txBody>
       </p:sp>
+      <p:sp>
+        <p:nvSpPr>
+          <p:cNvPr id="92" name="フローチャート : 結合子 91"/>
+          <p:cNvSpPr/>
+          <p:nvPr/>
+        </p:nvSpPr>
+        <p:spPr>
+          <a:xfrm>
+            <a:off x="2307866" y="1440507"/>
+            <a:ext cx="144021" cy="144020"/>
+          </a:xfrm>
+          <a:prstGeom prst="flowChartConnector">
+            <a:avLst/>
+          </a:prstGeom>
+          <a:solidFill>
+            <a:schemeClr val="tx1"/>
+          </a:solidFill>
+          <a:ln w="19050">
+            <a:solidFill>
+              <a:schemeClr val="tx1"/>
+            </a:solidFill>
+          </a:ln>
+        </p:spPr>
+        <p:style>
+          <a:lnRef idx="2">
+            <a:schemeClr val="accent1">
+              <a:shade val="50000"/>
+            </a:schemeClr>
+          </a:lnRef>
+          <a:fillRef idx="1">
+            <a:schemeClr val="accent1"/>
+          </a:fillRef>
+          <a:effectRef idx="0">
+            <a:schemeClr val="accent1"/>
+          </a:effectRef>
+          <a:fontRef idx="minor">
+            <a:schemeClr val="lt1"/>
+          </a:fontRef>
+        </p:style>
+        <p:txBody>
+          <a:bodyPr lIns="91439" tIns="45720" rIns="91439" bIns="45720" rtlCol="0" anchor="ctr"/>
+          <a:lstStyle/>
+          <a:p>
+            <a:pPr algn="ctr"/>
+            <a:endParaRPr lang="ja-JP" altLang="en-US" sz="1000"/>
+          </a:p>
+        </p:txBody>
+      </p:sp>
+      <p:sp>
+        <p:nvSpPr>
+          <p:cNvPr id="93" name="角丸四角形 92"/>
+          <p:cNvSpPr/>
+          <p:nvPr/>
+        </p:nvSpPr>
+        <p:spPr>
+          <a:xfrm>
+            <a:off x="1845835" y="1695312"/>
+            <a:ext cx="1067481" cy="538736"/>
+          </a:xfrm>
+          <a:prstGeom prst="roundRect">
+            <a:avLst/>
+          </a:prstGeom>
+          <a:noFill/>
+          <a:ln w="19050">
+            <a:solidFill>
+              <a:schemeClr val="tx1"/>
+            </a:solidFill>
+          </a:ln>
+        </p:spPr>
+        <p:style>
+          <a:lnRef idx="2">
+            <a:schemeClr val="accent1">
+              <a:shade val="50000"/>
+            </a:schemeClr>
+          </a:lnRef>
+          <a:fillRef idx="1">
+            <a:schemeClr val="accent1"/>
+          </a:fillRef>
+          <a:effectRef idx="0">
+            <a:schemeClr val="accent1"/>
+          </a:effectRef>
+          <a:fontRef idx="minor">
+            <a:schemeClr val="lt1"/>
+          </a:fontRef>
+        </p:style>
+        <p:txBody>
+          <a:bodyPr lIns="91439" tIns="45720" rIns="91439" bIns="45720" rtlCol="0" anchor="t" anchorCtr="0"/>
+          <a:lstStyle/>
+          <a:p>
+            <a:pPr algn="ctr"/>
+            <a:r>
+              <a:rPr lang="en-US" altLang="ja-JP" sz="1000" dirty="0" smtClean="0">
+                <a:solidFill>
+                  <a:schemeClr val="tx1"/>
+                </a:solidFill>
+              </a:rPr>
+              <a:t>State3_1</a:t>
+            </a:r>
+            <a:endParaRPr lang="ja-JP" altLang="en-US" sz="1000" dirty="0">
+              <a:solidFill>
+                <a:schemeClr val="tx1"/>
+              </a:solidFill>
+            </a:endParaRPr>
+          </a:p>
+        </p:txBody>
+      </p:sp>
+      <p:cxnSp>
+        <p:nvCxnSpPr>
+          <p:cNvPr id="94" name="直線コネクタ 93"/>
+          <p:cNvCxnSpPr/>
+          <p:nvPr/>
+        </p:nvCxnSpPr>
+        <p:spPr>
+          <a:xfrm>
+            <a:off x="1850596" y="1949365"/>
+            <a:ext cx="1058562" cy="0"/>
+          </a:xfrm>
+          <a:prstGeom prst="line">
+            <a:avLst/>
+          </a:prstGeom>
+          <a:ln w="12700">
+            <a:solidFill>
+              <a:schemeClr val="tx1"/>
+            </a:solidFill>
+          </a:ln>
+        </p:spPr>
+        <p:style>
+          <a:lnRef idx="1">
+            <a:schemeClr val="accent1"/>
+          </a:lnRef>
+          <a:fillRef idx="0">
+            <a:schemeClr val="accent1"/>
+          </a:fillRef>
+          <a:effectRef idx="0">
+            <a:schemeClr val="accent1"/>
+          </a:effectRef>
+          <a:fontRef idx="minor">
+            <a:schemeClr val="tx1"/>
+          </a:fontRef>
+        </p:style>
+      </p:cxnSp>
+      <p:cxnSp>
+        <p:nvCxnSpPr>
+          <p:cNvPr id="95" name="直線矢印コネクタ 28"/>
+          <p:cNvCxnSpPr>
+            <a:stCxn id="92" idx="4"/>
+            <a:endCxn id="93" idx="0"/>
+          </p:cNvCxnSpPr>
+          <p:nvPr/>
+        </p:nvCxnSpPr>
+        <p:spPr>
+          <a:xfrm flipH="1">
+            <a:off x="2379576" y="1584527"/>
+            <a:ext cx="301" cy="110785"/>
+          </a:xfrm>
+          <a:prstGeom prst="straightConnector1">
+            <a:avLst/>
+          </a:prstGeom>
+          <a:ln w="19050">
+            <a:solidFill>
+              <a:schemeClr val="tx1"/>
+            </a:solidFill>
+            <a:tailEnd type="arrow"/>
+          </a:ln>
+        </p:spPr>
+        <p:style>
+          <a:lnRef idx="1">
+            <a:schemeClr val="accent1"/>
+          </a:lnRef>
+          <a:fillRef idx="0">
+            <a:schemeClr val="accent1"/>
+          </a:fillRef>
+          <a:effectRef idx="0">
+            <a:schemeClr val="accent1"/>
+          </a:effectRef>
+          <a:fontRef idx="minor">
+            <a:schemeClr val="tx1"/>
+          </a:fontRef>
+        </p:style>
+      </p:cxnSp>
+      <p:cxnSp>
+        <p:nvCxnSpPr>
+          <p:cNvPr id="96" name="直線コネクタ 95"/>
+          <p:cNvCxnSpPr>
+            <a:stCxn id="77" idx="6"/>
+          </p:cNvCxnSpPr>
+          <p:nvPr/>
+        </p:nvCxnSpPr>
+        <p:spPr>
+          <a:xfrm flipV="1">
+            <a:off x="1793839" y="2621952"/>
+            <a:ext cx="2310964" cy="2095"/>
+          </a:xfrm>
+          <a:prstGeom prst="line">
+            <a:avLst/>
+          </a:prstGeom>
+          <a:ln w="12700">
+            <a:solidFill>
+              <a:schemeClr val="tx1"/>
+            </a:solidFill>
+            <a:prstDash val="dash"/>
+          </a:ln>
+        </p:spPr>
+        <p:style>
+          <a:lnRef idx="1">
+            <a:schemeClr val="accent1"/>
+          </a:lnRef>
+          <a:fillRef idx="0">
+            <a:schemeClr val="accent1"/>
+          </a:fillRef>
+          <a:effectRef idx="0">
+            <a:schemeClr val="accent1"/>
+          </a:effectRef>
+          <a:fontRef idx="minor">
+            <a:schemeClr val="tx1"/>
+          </a:fontRef>
+        </p:style>
+      </p:cxnSp>
+      <p:cxnSp>
+        <p:nvCxnSpPr>
+          <p:cNvPr id="97" name="直線矢印コネクタ 28"/>
+          <p:cNvCxnSpPr>
+            <a:endCxn id="93" idx="2"/>
+          </p:cNvCxnSpPr>
+          <p:nvPr/>
+        </p:nvCxnSpPr>
+        <p:spPr>
+          <a:xfrm flipV="1">
+            <a:off x="1772748" y="2234048"/>
+            <a:ext cx="606828" cy="233845"/>
+          </a:xfrm>
+          <a:prstGeom prst="straightConnector1">
+            <a:avLst/>
+          </a:prstGeom>
+          <a:ln w="19050">
+            <a:solidFill>
+              <a:schemeClr val="tx1"/>
+            </a:solidFill>
+            <a:tailEnd type="arrow"/>
+          </a:ln>
+        </p:spPr>
+        <p:style>
+          <a:lnRef idx="1">
+            <a:schemeClr val="accent1"/>
+          </a:lnRef>
+          <a:fillRef idx="0">
+            <a:schemeClr val="accent1"/>
+          </a:fillRef>
+          <a:effectRef idx="0">
+            <a:schemeClr val="accent1"/>
+          </a:effectRef>
+          <a:fontRef idx="minor">
+            <a:schemeClr val="tx1"/>
+          </a:fontRef>
+        </p:style>
+      </p:cxnSp>
+      <p:sp>
+        <p:nvSpPr>
+          <p:cNvPr id="98" name="角丸四角形 97"/>
+          <p:cNvSpPr/>
+          <p:nvPr/>
+        </p:nvSpPr>
+        <p:spPr>
+          <a:xfrm>
+            <a:off x="2949321" y="1695312"/>
+            <a:ext cx="1067481" cy="538736"/>
+          </a:xfrm>
+          <a:prstGeom prst="roundRect">
+            <a:avLst/>
+          </a:prstGeom>
+          <a:noFill/>
+          <a:ln w="19050">
+            <a:solidFill>
+              <a:schemeClr val="tx1"/>
+            </a:solidFill>
+          </a:ln>
+        </p:spPr>
+        <p:style>
+          <a:lnRef idx="2">
+            <a:schemeClr val="accent1">
+              <a:shade val="50000"/>
+            </a:schemeClr>
+          </a:lnRef>
+          <a:fillRef idx="1">
+            <a:schemeClr val="accent1"/>
+          </a:fillRef>
+          <a:effectRef idx="0">
+            <a:schemeClr val="accent1"/>
+          </a:effectRef>
+          <a:fontRef idx="minor">
+            <a:schemeClr val="lt1"/>
+          </a:fontRef>
+        </p:style>
+        <p:txBody>
+          <a:bodyPr lIns="91439" tIns="45720" rIns="91439" bIns="45720" rtlCol="0" anchor="t" anchorCtr="0"/>
+          <a:lstStyle/>
+          <a:p>
+            <a:pPr algn="ctr"/>
+            <a:r>
+              <a:rPr lang="en-US" altLang="ja-JP" sz="1000" dirty="0" smtClean="0">
+                <a:solidFill>
+                  <a:schemeClr val="tx1"/>
+                </a:solidFill>
+              </a:rPr>
+              <a:t>State3_2</a:t>
+            </a:r>
+            <a:endParaRPr lang="ja-JP" altLang="en-US" sz="1000" dirty="0">
+              <a:solidFill>
+                <a:schemeClr val="tx1"/>
+              </a:solidFill>
+            </a:endParaRPr>
+          </a:p>
+        </p:txBody>
+      </p:sp>
+      <p:cxnSp>
+        <p:nvCxnSpPr>
+          <p:cNvPr id="99" name="直線コネクタ 98"/>
+          <p:cNvCxnSpPr/>
+          <p:nvPr/>
+        </p:nvCxnSpPr>
+        <p:spPr>
+          <a:xfrm>
+            <a:off x="2954082" y="1949365"/>
+            <a:ext cx="1058562" cy="0"/>
+          </a:xfrm>
+          <a:prstGeom prst="line">
+            <a:avLst/>
+          </a:prstGeom>
+          <a:ln w="12700">
+            <a:solidFill>
+              <a:schemeClr val="tx1"/>
+            </a:solidFill>
+          </a:ln>
+        </p:spPr>
+        <p:style>
+          <a:lnRef idx="1">
+            <a:schemeClr val="accent1"/>
+          </a:lnRef>
+          <a:fillRef idx="0">
+            <a:schemeClr val="accent1"/>
+          </a:fillRef>
+          <a:effectRef idx="0">
+            <a:schemeClr val="accent1"/>
+          </a:effectRef>
+          <a:fontRef idx="minor">
+            <a:schemeClr val="tx1"/>
+          </a:fontRef>
+        </p:style>
+      </p:cxnSp>
+      <p:cxnSp>
+        <p:nvCxnSpPr>
+          <p:cNvPr id="100" name="直線矢印コネクタ 28"/>
+          <p:cNvCxnSpPr>
+            <a:stCxn id="77" idx="6"/>
+            <a:endCxn id="98" idx="2"/>
+          </p:cNvCxnSpPr>
+          <p:nvPr/>
+        </p:nvCxnSpPr>
+        <p:spPr>
+          <a:xfrm flipV="1">
+            <a:off x="1793839" y="2234048"/>
+            <a:ext cx="1689223" cy="389999"/>
+          </a:xfrm>
+          <a:prstGeom prst="straightConnector1">
+            <a:avLst/>
+          </a:prstGeom>
+          <a:ln w="19050">
+            <a:solidFill>
+              <a:schemeClr val="tx1"/>
+            </a:solidFill>
+            <a:tailEnd type="arrow"/>
+          </a:ln>
+        </p:spPr>
+        <p:style>
+          <a:lnRef idx="1">
+            <a:schemeClr val="accent1"/>
+          </a:lnRef>
+          <a:fillRef idx="0">
+            <a:schemeClr val="accent1"/>
+          </a:fillRef>
+          <a:effectRef idx="0">
+            <a:schemeClr val="accent1"/>
+          </a:effectRef>
+          <a:fontRef idx="minor">
+            <a:schemeClr val="tx1"/>
+          </a:fontRef>
+        </p:style>
+      </p:cxnSp>
+      <p:sp>
+        <p:nvSpPr>
+          <p:cNvPr id="101" name="角丸四角形吹き出し 100"/>
+          <p:cNvSpPr/>
+          <p:nvPr/>
+        </p:nvSpPr>
+        <p:spPr>
+          <a:xfrm>
+            <a:off x="1817994" y="3615914"/>
+            <a:ext cx="881071" cy="370001"/>
+          </a:xfrm>
+          <a:prstGeom prst="wedgeRoundRectCallout">
+            <a:avLst>
+              <a:gd name="adj1" fmla="val 37212"/>
+              <a:gd name="adj2" fmla="val -114704"/>
+              <a:gd name="adj3" fmla="val 16667"/>
+            </a:avLst>
+          </a:prstGeom>
+        </p:spPr>
+        <p:style>
+          <a:lnRef idx="1">
+            <a:schemeClr val="accent6"/>
+          </a:lnRef>
+          <a:fillRef idx="2">
+            <a:schemeClr val="accent6"/>
+          </a:fillRef>
+          <a:effectRef idx="1">
+            <a:schemeClr val="accent6"/>
+          </a:effectRef>
+          <a:fontRef idx="minor">
+            <a:schemeClr val="dk1"/>
+          </a:fontRef>
+        </p:style>
+        <p:txBody>
+          <a:bodyPr rtlCol="0" anchor="ctr"/>
+          <a:lstStyle>
+            <a:defPPr>
+              <a:defRPr lang="ja-JP"/>
+            </a:defPPr>
+            <a:lvl1pPr marL="0" algn="l" defTabSz="395955" rtl="0" eaLnBrk="1" latinLnBrk="0" hangingPunct="1">
+              <a:defRPr kumimoji="1" sz="800" kern="1200">
+                <a:solidFill>
+                  <a:schemeClr val="dk1"/>
+                </a:solidFill>
+                <a:latin typeface="+mn-lt"/>
+                <a:ea typeface="+mn-ea"/>
+                <a:cs typeface="+mn-cs"/>
+              </a:defRPr>
+            </a:lvl1pPr>
+            <a:lvl2pPr marL="197978" algn="l" defTabSz="395955" rtl="0" eaLnBrk="1" latinLnBrk="0" hangingPunct="1">
+              <a:defRPr kumimoji="1" sz="800" kern="1200">
+                <a:solidFill>
+                  <a:schemeClr val="dk1"/>
+                </a:solidFill>
+                <a:latin typeface="+mn-lt"/>
+                <a:ea typeface="+mn-ea"/>
+                <a:cs typeface="+mn-cs"/>
+              </a:defRPr>
+            </a:lvl2pPr>
+            <a:lvl3pPr marL="395955" algn="l" defTabSz="395955" rtl="0" eaLnBrk="1" latinLnBrk="0" hangingPunct="1">
+              <a:defRPr kumimoji="1" sz="800" kern="1200">
+                <a:solidFill>
+                  <a:schemeClr val="dk1"/>
+                </a:solidFill>
+                <a:latin typeface="+mn-lt"/>
+                <a:ea typeface="+mn-ea"/>
+                <a:cs typeface="+mn-cs"/>
+              </a:defRPr>
+            </a:lvl3pPr>
+            <a:lvl4pPr marL="593932" algn="l" defTabSz="395955" rtl="0" eaLnBrk="1" latinLnBrk="0" hangingPunct="1">
+              <a:defRPr kumimoji="1" sz="800" kern="1200">
+                <a:solidFill>
+                  <a:schemeClr val="dk1"/>
+                </a:solidFill>
+                <a:latin typeface="+mn-lt"/>
+                <a:ea typeface="+mn-ea"/>
+                <a:cs typeface="+mn-cs"/>
+              </a:defRPr>
+            </a:lvl4pPr>
+            <a:lvl5pPr marL="791910" algn="l" defTabSz="395955" rtl="0" eaLnBrk="1" latinLnBrk="0" hangingPunct="1">
+              <a:defRPr kumimoji="1" sz="800" kern="1200">
+                <a:solidFill>
+                  <a:schemeClr val="dk1"/>
+                </a:solidFill>
+                <a:latin typeface="+mn-lt"/>
+                <a:ea typeface="+mn-ea"/>
+                <a:cs typeface="+mn-cs"/>
+              </a:defRPr>
+            </a:lvl5pPr>
+            <a:lvl6pPr marL="989888" algn="l" defTabSz="395955" rtl="0" eaLnBrk="1" latinLnBrk="0" hangingPunct="1">
+              <a:defRPr kumimoji="1" sz="800" kern="1200">
+                <a:solidFill>
+                  <a:schemeClr val="dk1"/>
+                </a:solidFill>
+                <a:latin typeface="+mn-lt"/>
+                <a:ea typeface="+mn-ea"/>
+                <a:cs typeface="+mn-cs"/>
+              </a:defRPr>
+            </a:lvl6pPr>
+            <a:lvl7pPr marL="1187866" algn="l" defTabSz="395955" rtl="0" eaLnBrk="1" latinLnBrk="0" hangingPunct="1">
+              <a:defRPr kumimoji="1" sz="800" kern="1200">
+                <a:solidFill>
+                  <a:schemeClr val="dk1"/>
+                </a:solidFill>
+                <a:latin typeface="+mn-lt"/>
+                <a:ea typeface="+mn-ea"/>
+                <a:cs typeface="+mn-cs"/>
+              </a:defRPr>
+            </a:lvl7pPr>
+            <a:lvl8pPr marL="1385842" algn="l" defTabSz="395955" rtl="0" eaLnBrk="1" latinLnBrk="0" hangingPunct="1">
+              <a:defRPr kumimoji="1" sz="800" kern="1200">
+                <a:solidFill>
+                  <a:schemeClr val="dk1"/>
+                </a:solidFill>
+                <a:latin typeface="+mn-lt"/>
+                <a:ea typeface="+mn-ea"/>
+                <a:cs typeface="+mn-cs"/>
+              </a:defRPr>
+            </a:lvl8pPr>
+            <a:lvl9pPr marL="1583820" algn="l" defTabSz="395955" rtl="0" eaLnBrk="1" latinLnBrk="0" hangingPunct="1">
+              <a:defRPr kumimoji="1" sz="800" kern="1200">
+                <a:solidFill>
+                  <a:schemeClr val="dk1"/>
+                </a:solidFill>
+                <a:latin typeface="+mn-lt"/>
+                <a:ea typeface="+mn-ea"/>
+                <a:cs typeface="+mn-cs"/>
+              </a:defRPr>
+            </a:lvl9pPr>
+          </a:lstStyle>
+          <a:p>
+            <a:pPr algn="ctr"/>
+            <a:r>
+              <a:rPr lang="en-US" altLang="ja-JP" dirty="0" smtClean="0">
+                <a:solidFill>
+                  <a:schemeClr val="tx1"/>
+                </a:solidFill>
+              </a:rPr>
+              <a:t>OK, transition </a:t>
+            </a:r>
+            <a:r>
+              <a:rPr lang="en-US" altLang="ja-JP" b="1" dirty="0" smtClean="0">
+                <a:solidFill>
+                  <a:schemeClr val="tx1"/>
+                </a:solidFill>
+              </a:rPr>
+              <a:t>to</a:t>
+            </a:r>
+            <a:r>
+              <a:rPr lang="en-US" altLang="ja-JP" dirty="0" smtClean="0">
+                <a:solidFill>
+                  <a:schemeClr val="tx1"/>
+                </a:solidFill>
+              </a:rPr>
+              <a:t> at most a single vertex</a:t>
+            </a:r>
+            <a:endParaRPr kumimoji="1" lang="ja-JP" altLang="en-US" dirty="0">
+              <a:solidFill>
+                <a:schemeClr val="tx1"/>
+              </a:solidFill>
+            </a:endParaRPr>
+          </a:p>
+        </p:txBody>
+      </p:sp>
+      <p:sp>
+        <p:nvSpPr>
+          <p:cNvPr id="102" name="角丸四角形吹き出し 101"/>
+          <p:cNvSpPr/>
+          <p:nvPr/>
+        </p:nvSpPr>
+        <p:spPr>
+          <a:xfrm>
+            <a:off x="2258530" y="2664643"/>
+            <a:ext cx="1270209" cy="310712"/>
+          </a:xfrm>
+          <a:prstGeom prst="wedgeRoundRectCallout">
+            <a:avLst>
+              <a:gd name="adj1" fmla="val 12114"/>
+              <a:gd name="adj2" fmla="val -121511"/>
+              <a:gd name="adj3" fmla="val 16667"/>
+            </a:avLst>
+          </a:prstGeom>
+        </p:spPr>
+        <p:style>
+          <a:lnRef idx="1">
+            <a:schemeClr val="accent6"/>
+          </a:lnRef>
+          <a:fillRef idx="2">
+            <a:schemeClr val="accent6"/>
+          </a:fillRef>
+          <a:effectRef idx="1">
+            <a:schemeClr val="accent6"/>
+          </a:effectRef>
+          <a:fontRef idx="minor">
+            <a:schemeClr val="dk1"/>
+          </a:fontRef>
+        </p:style>
+        <p:txBody>
+          <a:bodyPr rtlCol="0" anchor="ctr"/>
+          <a:lstStyle>
+            <a:defPPr>
+              <a:defRPr lang="ja-JP"/>
+            </a:defPPr>
+            <a:lvl1pPr marL="0" algn="l" defTabSz="395955" rtl="0" eaLnBrk="1" latinLnBrk="0" hangingPunct="1">
+              <a:defRPr kumimoji="1" sz="800" kern="1200">
+                <a:solidFill>
+                  <a:schemeClr val="dk1"/>
+                </a:solidFill>
+                <a:latin typeface="+mn-lt"/>
+                <a:ea typeface="+mn-ea"/>
+                <a:cs typeface="+mn-cs"/>
+              </a:defRPr>
+            </a:lvl1pPr>
+            <a:lvl2pPr marL="197978" algn="l" defTabSz="395955" rtl="0" eaLnBrk="1" latinLnBrk="0" hangingPunct="1">
+              <a:defRPr kumimoji="1" sz="800" kern="1200">
+                <a:solidFill>
+                  <a:schemeClr val="dk1"/>
+                </a:solidFill>
+                <a:latin typeface="+mn-lt"/>
+                <a:ea typeface="+mn-ea"/>
+                <a:cs typeface="+mn-cs"/>
+              </a:defRPr>
+            </a:lvl2pPr>
+            <a:lvl3pPr marL="395955" algn="l" defTabSz="395955" rtl="0" eaLnBrk="1" latinLnBrk="0" hangingPunct="1">
+              <a:defRPr kumimoji="1" sz="800" kern="1200">
+                <a:solidFill>
+                  <a:schemeClr val="dk1"/>
+                </a:solidFill>
+                <a:latin typeface="+mn-lt"/>
+                <a:ea typeface="+mn-ea"/>
+                <a:cs typeface="+mn-cs"/>
+              </a:defRPr>
+            </a:lvl3pPr>
+            <a:lvl4pPr marL="593932" algn="l" defTabSz="395955" rtl="0" eaLnBrk="1" latinLnBrk="0" hangingPunct="1">
+              <a:defRPr kumimoji="1" sz="800" kern="1200">
+                <a:solidFill>
+                  <a:schemeClr val="dk1"/>
+                </a:solidFill>
+                <a:latin typeface="+mn-lt"/>
+                <a:ea typeface="+mn-ea"/>
+                <a:cs typeface="+mn-cs"/>
+              </a:defRPr>
+            </a:lvl4pPr>
+            <a:lvl5pPr marL="791910" algn="l" defTabSz="395955" rtl="0" eaLnBrk="1" latinLnBrk="0" hangingPunct="1">
+              <a:defRPr kumimoji="1" sz="800" kern="1200">
+                <a:solidFill>
+                  <a:schemeClr val="dk1"/>
+                </a:solidFill>
+                <a:latin typeface="+mn-lt"/>
+                <a:ea typeface="+mn-ea"/>
+                <a:cs typeface="+mn-cs"/>
+              </a:defRPr>
+            </a:lvl5pPr>
+            <a:lvl6pPr marL="989888" algn="l" defTabSz="395955" rtl="0" eaLnBrk="1" latinLnBrk="0" hangingPunct="1">
+              <a:defRPr kumimoji="1" sz="800" kern="1200">
+                <a:solidFill>
+                  <a:schemeClr val="dk1"/>
+                </a:solidFill>
+                <a:latin typeface="+mn-lt"/>
+                <a:ea typeface="+mn-ea"/>
+                <a:cs typeface="+mn-cs"/>
+              </a:defRPr>
+            </a:lvl6pPr>
+            <a:lvl7pPr marL="1187866" algn="l" defTabSz="395955" rtl="0" eaLnBrk="1" latinLnBrk="0" hangingPunct="1">
+              <a:defRPr kumimoji="1" sz="800" kern="1200">
+                <a:solidFill>
+                  <a:schemeClr val="dk1"/>
+                </a:solidFill>
+                <a:latin typeface="+mn-lt"/>
+                <a:ea typeface="+mn-ea"/>
+                <a:cs typeface="+mn-cs"/>
+              </a:defRPr>
+            </a:lvl7pPr>
+            <a:lvl8pPr marL="1385842" algn="l" defTabSz="395955" rtl="0" eaLnBrk="1" latinLnBrk="0" hangingPunct="1">
+              <a:defRPr kumimoji="1" sz="800" kern="1200">
+                <a:solidFill>
+                  <a:schemeClr val="dk1"/>
+                </a:solidFill>
+                <a:latin typeface="+mn-lt"/>
+                <a:ea typeface="+mn-ea"/>
+                <a:cs typeface="+mn-cs"/>
+              </a:defRPr>
+            </a:lvl8pPr>
+            <a:lvl9pPr marL="1583820" algn="l" defTabSz="395955" rtl="0" eaLnBrk="1" latinLnBrk="0" hangingPunct="1">
+              <a:defRPr kumimoji="1" sz="800" kern="1200">
+                <a:solidFill>
+                  <a:schemeClr val="dk1"/>
+                </a:solidFill>
+                <a:latin typeface="+mn-lt"/>
+                <a:ea typeface="+mn-ea"/>
+                <a:cs typeface="+mn-cs"/>
+              </a:defRPr>
+            </a:lvl9pPr>
+          </a:lstStyle>
+          <a:p>
+            <a:pPr algn="ctr"/>
+            <a:r>
+              <a:rPr lang="en-US" altLang="ja-JP" dirty="0" smtClean="0">
+                <a:solidFill>
+                  <a:schemeClr val="tx1"/>
+                </a:solidFill>
+              </a:rPr>
+              <a:t>NG, transition </a:t>
+            </a:r>
+            <a:r>
+              <a:rPr lang="en-US" altLang="ja-JP" b="1" dirty="0" smtClean="0">
+                <a:solidFill>
+                  <a:schemeClr val="tx1"/>
+                </a:solidFill>
+              </a:rPr>
+              <a:t>to</a:t>
+            </a:r>
+            <a:r>
+              <a:rPr lang="en-US" altLang="ja-JP" dirty="0" smtClean="0">
+                <a:solidFill>
+                  <a:schemeClr val="tx1"/>
+                </a:solidFill>
+              </a:rPr>
+              <a:t> over one vertices</a:t>
+            </a:r>
+            <a:endParaRPr kumimoji="1" lang="ja-JP" altLang="en-US" dirty="0">
+              <a:solidFill>
+                <a:schemeClr val="tx1"/>
+              </a:solidFill>
+            </a:endParaRPr>
+          </a:p>
+        </p:txBody>
+      </p:sp>
+      <p:sp>
+        <p:nvSpPr>
+          <p:cNvPr id="103" name="正方形/長方形 102"/>
+          <p:cNvSpPr/>
+          <p:nvPr/>
+        </p:nvSpPr>
+        <p:spPr>
+          <a:xfrm>
+            <a:off x="292885" y="72355"/>
+            <a:ext cx="3883926" cy="507831"/>
+          </a:xfrm>
+          <a:prstGeom prst="rect">
+            <a:avLst/>
+          </a:prstGeom>
+        </p:spPr>
+        <p:style>
+          <a:lnRef idx="2">
+            <a:schemeClr val="accent1"/>
+          </a:lnRef>
+          <a:fillRef idx="1">
+            <a:schemeClr val="lt1"/>
+          </a:fillRef>
+          <a:effectRef idx="0">
+            <a:schemeClr val="accent1"/>
+          </a:effectRef>
+          <a:fontRef idx="minor">
+            <a:schemeClr val="dk1"/>
+          </a:fontRef>
+        </p:style>
+        <p:txBody>
+          <a:bodyPr wrap="square">
+            <a:spAutoFit/>
+          </a:bodyPr>
+          <a:lstStyle/>
+          <a:p>
+            <a:r>
+              <a:rPr lang="en-US" altLang="ja-JP" dirty="0"/>
+              <a:t>An </a:t>
+            </a:r>
+            <a:r>
+              <a:rPr lang="en-US" altLang="ja-JP" i="1" dirty="0"/>
+              <a:t>entry point </a:t>
+            </a:r>
+            <a:r>
+              <a:rPr lang="en-US" altLang="ja-JP" dirty="0" err="1"/>
+              <a:t>pseudostate</a:t>
+            </a:r>
+            <a:r>
+              <a:rPr lang="en-US" altLang="ja-JP" dirty="0"/>
+              <a:t> is an entry point of a state machine or composite state. In each region of the state machine or composite state it has at most a single transition to a vertex within the same region. </a:t>
+            </a:r>
+            <a:endParaRPr lang="ja-JP" altLang="en-US" dirty="0"/>
+          </a:p>
+        </p:txBody>
+      </p:sp>
+      <p:sp>
+        <p:nvSpPr>
+          <p:cNvPr id="52" name="正方形/長方形 51"/>
+          <p:cNvSpPr/>
+          <p:nvPr/>
+        </p:nvSpPr>
+        <p:spPr>
+          <a:xfrm>
+            <a:off x="2390058" y="580186"/>
+            <a:ext cx="1794081" cy="230832"/>
+          </a:xfrm>
+          <a:prstGeom prst="rect">
+            <a:avLst/>
+          </a:prstGeom>
+        </p:spPr>
+        <p:txBody>
+          <a:bodyPr wrap="none">
+            <a:spAutoFit/>
+          </a:bodyPr>
+          <a:lstStyle/>
+          <a:p>
+            <a:r>
+              <a:rPr lang="en-US" altLang="ja-JP" dirty="0"/>
+              <a:t> (11-08-06.pdf §15.3.8 page 551).</a:t>
+            </a:r>
+            <a:endParaRPr lang="ja-JP" altLang="en-US" dirty="0"/>
+          </a:p>
+        </p:txBody>
+      </p:sp>
+      <p:cxnSp>
+        <p:nvCxnSpPr>
+          <p:cNvPr id="54" name="直線矢印コネクタ 53"/>
+          <p:cNvCxnSpPr/>
+          <p:nvPr/>
+        </p:nvCxnSpPr>
+        <p:spPr>
+          <a:xfrm>
+            <a:off x="1358900" y="360387"/>
+            <a:ext cx="585663" cy="1257365"/>
+          </a:xfrm>
+          <a:prstGeom prst="straightConnector1">
+            <a:avLst/>
+          </a:prstGeom>
+          <a:ln>
+            <a:solidFill>
+              <a:schemeClr val="accent6">
+                <a:lumMod val="75000"/>
+              </a:schemeClr>
+            </a:solidFill>
+            <a:tailEnd type="arrow"/>
+          </a:ln>
+        </p:spPr>
+        <p:style>
+          <a:lnRef idx="1">
+            <a:schemeClr val="accent1"/>
+          </a:lnRef>
+          <a:fillRef idx="0">
+            <a:schemeClr val="accent1"/>
+          </a:fillRef>
+          <a:effectRef idx="0">
+            <a:schemeClr val="accent1"/>
+          </a:effectRef>
+          <a:fontRef idx="minor">
+            <a:schemeClr val="tx1"/>
+          </a:fontRef>
+        </p:style>
+      </p:cxnSp>
+      <p:cxnSp>
+        <p:nvCxnSpPr>
+          <p:cNvPr id="107" name="直線矢印コネクタ 106"/>
+          <p:cNvCxnSpPr/>
+          <p:nvPr/>
+        </p:nvCxnSpPr>
+        <p:spPr>
+          <a:xfrm>
+            <a:off x="1358900" y="366518"/>
+            <a:ext cx="2424759" cy="2421235"/>
+          </a:xfrm>
+          <a:prstGeom prst="straightConnector1">
+            <a:avLst/>
+          </a:prstGeom>
+          <a:ln>
+            <a:solidFill>
+              <a:schemeClr val="accent6">
+                <a:lumMod val="75000"/>
+              </a:schemeClr>
+            </a:solidFill>
+            <a:tailEnd type="arrow"/>
+          </a:ln>
+        </p:spPr>
+        <p:style>
+          <a:lnRef idx="1">
+            <a:schemeClr val="accent1"/>
+          </a:lnRef>
+          <a:fillRef idx="0">
+            <a:schemeClr val="accent1"/>
+          </a:fillRef>
+          <a:effectRef idx="0">
+            <a:schemeClr val="accent1"/>
+          </a:effectRef>
+          <a:fontRef idx="minor">
+            <a:schemeClr val="tx1"/>
+          </a:fontRef>
+        </p:style>
+      </p:cxnSp>
+      <p:cxnSp>
+        <p:nvCxnSpPr>
+          <p:cNvPr id="104" name="直線コネクタ 103"/>
+          <p:cNvCxnSpPr/>
+          <p:nvPr/>
+        </p:nvCxnSpPr>
+        <p:spPr>
+          <a:xfrm>
+            <a:off x="646385" y="366518"/>
+            <a:ext cx="712515" cy="0"/>
+          </a:xfrm>
+          <a:prstGeom prst="line">
+            <a:avLst/>
+          </a:prstGeom>
+          <a:ln>
+            <a:solidFill>
+              <a:schemeClr val="accent6">
+                <a:lumMod val="75000"/>
+              </a:schemeClr>
+            </a:solidFill>
+          </a:ln>
+        </p:spPr>
+        <p:style>
+          <a:lnRef idx="1">
+            <a:schemeClr val="accent1"/>
+          </a:lnRef>
+          <a:fillRef idx="0">
+            <a:schemeClr val="accent1"/>
+          </a:fillRef>
+          <a:effectRef idx="0">
+            <a:schemeClr val="accent1"/>
+          </a:effectRef>
+          <a:fontRef idx="minor">
+            <a:schemeClr val="tx1"/>
+          </a:fontRef>
+        </p:style>
+      </p:cxnSp>
+      <p:cxnSp>
+        <p:nvCxnSpPr>
+          <p:cNvPr id="116" name="直線コネクタ 115"/>
+          <p:cNvCxnSpPr/>
+          <p:nvPr/>
+        </p:nvCxnSpPr>
+        <p:spPr>
+          <a:xfrm>
+            <a:off x="3198416" y="366518"/>
+            <a:ext cx="122634" cy="0"/>
+          </a:xfrm>
+          <a:prstGeom prst="line">
+            <a:avLst/>
+          </a:prstGeom>
+          <a:ln>
+            <a:solidFill>
+              <a:schemeClr val="accent6">
+                <a:lumMod val="75000"/>
+              </a:schemeClr>
+            </a:solidFill>
+          </a:ln>
+        </p:spPr>
+        <p:style>
+          <a:lnRef idx="1">
+            <a:schemeClr val="accent1"/>
+          </a:lnRef>
+          <a:fillRef idx="0">
+            <a:schemeClr val="accent1"/>
+          </a:fillRef>
+          <a:effectRef idx="0">
+            <a:schemeClr val="accent1"/>
+          </a:effectRef>
+          <a:fontRef idx="minor">
+            <a:schemeClr val="tx1"/>
+          </a:fontRef>
+        </p:style>
+      </p:cxnSp>
+      <p:cxnSp>
+        <p:nvCxnSpPr>
+          <p:cNvPr id="119" name="直線矢印コネクタ 118"/>
+          <p:cNvCxnSpPr>
+            <a:endCxn id="77" idx="0"/>
+          </p:cNvCxnSpPr>
+          <p:nvPr/>
+        </p:nvCxnSpPr>
+        <p:spPr>
+          <a:xfrm flipH="1">
+            <a:off x="1721829" y="368535"/>
+            <a:ext cx="1540013" cy="2183502"/>
+          </a:xfrm>
+          <a:prstGeom prst="straightConnector1">
+            <a:avLst/>
+          </a:prstGeom>
+          <a:ln>
+            <a:solidFill>
+              <a:schemeClr val="accent6">
+                <a:lumMod val="75000"/>
+              </a:schemeClr>
+            </a:solidFill>
+            <a:tailEnd type="arrow"/>
+          </a:ln>
+        </p:spPr>
+        <p:style>
+          <a:lnRef idx="1">
+            <a:schemeClr val="accent1"/>
+          </a:lnRef>
+          <a:fillRef idx="0">
+            <a:schemeClr val="accent1"/>
+          </a:fillRef>
+          <a:effectRef idx="0">
+            <a:schemeClr val="accent1"/>
+          </a:effectRef>
+          <a:fontRef idx="minor">
+            <a:schemeClr val="tx1"/>
+          </a:fontRef>
+        </p:style>
+      </p:cxnSp>
+      <p:cxnSp>
+        <p:nvCxnSpPr>
+          <p:cNvPr id="122" name="直線コネクタ 121"/>
+          <p:cNvCxnSpPr/>
+          <p:nvPr/>
+        </p:nvCxnSpPr>
+        <p:spPr>
+          <a:xfrm>
+            <a:off x="679450" y="512568"/>
+            <a:ext cx="584200" cy="0"/>
+          </a:xfrm>
+          <a:prstGeom prst="line">
+            <a:avLst/>
+          </a:prstGeom>
+          <a:ln>
+            <a:solidFill>
+              <a:schemeClr val="accent6">
+                <a:lumMod val="75000"/>
+              </a:schemeClr>
+            </a:solidFill>
+          </a:ln>
+        </p:spPr>
+        <p:style>
+          <a:lnRef idx="1">
+            <a:schemeClr val="accent1"/>
+          </a:lnRef>
+          <a:fillRef idx="0">
+            <a:schemeClr val="accent1"/>
+          </a:fillRef>
+          <a:effectRef idx="0">
+            <a:schemeClr val="accent1"/>
+          </a:effectRef>
+          <a:fontRef idx="minor">
+            <a:schemeClr val="tx1"/>
+          </a:fontRef>
+        </p:style>
+      </p:cxnSp>
     </p:spTree>
     <p:extLst>
       <p:ext uri="{BB962C8B-B14F-4D97-AF65-F5344CB8AC3E}">

</xml_diff>